<commit_message>
edit image filter feature in developer guide
</commit_message>
<xml_diff>
--- a/docs/diagrams/ContrastCommandDiagram.pptx
+++ b/docs/diagrams/ContrastCommandDiagram.pptx
@@ -3610,7 +3610,7 @@
         <p:spPr>
           <a:xfrm>
             <a:off x="4383297" y="872698"/>
-            <a:ext cx="1219200" cy="467684"/>
+            <a:ext cx="1126252" cy="467684"/>
           </a:xfrm>
           <a:prstGeom prst="rect">
             <a:avLst/>
@@ -3650,18 +3650,15 @@
                   <a:schemeClr val="bg1"/>
                 </a:solidFill>
               </a:rPr>
-              <a:t>:Address</a:t>
-            </a:r>
-          </a:p>
-          <a:p>
-            <a:pPr algn="ctr"/>
+              <a:t>:</a:t>
+            </a:r>
             <a:r>
               <a:rPr lang="en-US" sz="1600" dirty="0" err="1">
                 <a:solidFill>
                   <a:schemeClr val="bg1"/>
                 </a:solidFill>
               </a:rPr>
-              <a:t>BookParser</a:t>
+              <a:t>FomoFotoParser</a:t>
             </a:r>
             <a:endParaRPr lang="en-SG" sz="1600" dirty="0">
               <a:solidFill>

</xml_diff>

<commit_message>
Modify logic sequence diagrams due to some changes in the command code
</commit_message>
<xml_diff>
--- a/docs/diagrams/ContrastCommandDiagram.pptx
+++ b/docs/diagrams/ContrastCommandDiagram.pptx
@@ -3827,7 +3827,6 @@
           <p:cNvCxnSpPr>
             <a:cxnSpLocks/>
             <a:stCxn id="21" idx="0"/>
-            <a:endCxn id="4" idx="0"/>
           </p:cNvCxnSpPr>
           <p:nvPr/>
         </p:nvCxnSpPr>
@@ -4400,7 +4399,7 @@
         </p:nvSpPr>
         <p:spPr>
           <a:xfrm>
-            <a:off x="1042172" y="5251756"/>
+            <a:off x="1159186" y="5267675"/>
             <a:ext cx="1437667" cy="215444"/>
           </a:xfrm>
           <a:prstGeom prst="rect">
@@ -4425,6 +4424,7 @@
             </a:lvl1pPr>
           </a:lstStyle>
           <a:p>
+            <a:pPr algn="ctr"/>
             <a:r>
               <a:rPr lang="en-US" dirty="0" err="1"/>
               <a:t>CommandResult</a:t>
@@ -4725,39 +4725,6 @@
           </a:fontRef>
         </p:style>
       </p:cxnSp>
-      <p:sp>
-        <p:nvSpPr>
-          <p:cNvPr id="4" name="TextBox 3"/>
-          <p:cNvSpPr txBox="1"/>
-          <p:nvPr/>
-        </p:nvSpPr>
-        <p:spPr>
-          <a:xfrm>
-            <a:off x="6418989" y="5478876"/>
-            <a:ext cx="258404" cy="261610"/>
-          </a:xfrm>
-          <a:prstGeom prst="rect">
-            <a:avLst/>
-          </a:prstGeom>
-          <a:noFill/>
-        </p:spPr>
-        <p:txBody>
-          <a:bodyPr wrap="square" rtlCol="0">
-            <a:spAutoFit/>
-          </a:bodyPr>
-          <a:lstStyle/>
-          <a:p>
-            <a:r>
-              <a:rPr lang="en-SG" sz="1100" dirty="0">
-                <a:solidFill>
-                  <a:srgbClr val="002060"/>
-                </a:solidFill>
-              </a:rPr>
-              <a:t>X</a:t>
-            </a:r>
-          </a:p>
-        </p:txBody>
-      </p:sp>
       <p:sp>
         <p:nvSpPr>
           <p:cNvPr id="19" name="Rectangle 62"/>

</xml_diff>

<commit_message>
Edit a small mistake in ppp
</commit_message>
<xml_diff>
--- a/docs/diagrams/ContrastCommandDiagram.pptx
+++ b/docs/diagrams/ContrastCommandDiagram.pptx
@@ -259,7 +259,7 @@
           <a:p>
             <a:fld id="{A995DD06-FA5B-3C4A-9EC2-FFA80E37B40D}" type="datetimeFigureOut">
               <a:rPr lang="en-US" smtClean="0"/>
-              <a:t>4/14/19</a:t>
+              <a:t>4/15/19</a:t>
             </a:fld>
             <a:endParaRPr lang="en-US"/>
           </a:p>
@@ -457,7 +457,7 @@
           <a:p>
             <a:fld id="{A995DD06-FA5B-3C4A-9EC2-FFA80E37B40D}" type="datetimeFigureOut">
               <a:rPr lang="en-US" smtClean="0"/>
-              <a:t>4/14/19</a:t>
+              <a:t>4/15/19</a:t>
             </a:fld>
             <a:endParaRPr lang="en-US"/>
           </a:p>
@@ -665,7 +665,7 @@
           <a:p>
             <a:fld id="{A995DD06-FA5B-3C4A-9EC2-FFA80E37B40D}" type="datetimeFigureOut">
               <a:rPr lang="en-US" smtClean="0"/>
-              <a:t>4/14/19</a:t>
+              <a:t>4/15/19</a:t>
             </a:fld>
             <a:endParaRPr lang="en-US"/>
           </a:p>
@@ -863,7 +863,7 @@
           <a:p>
             <a:fld id="{A995DD06-FA5B-3C4A-9EC2-FFA80E37B40D}" type="datetimeFigureOut">
               <a:rPr lang="en-US" smtClean="0"/>
-              <a:t>4/14/19</a:t>
+              <a:t>4/15/19</a:t>
             </a:fld>
             <a:endParaRPr lang="en-US"/>
           </a:p>
@@ -1138,7 +1138,7 @@
           <a:p>
             <a:fld id="{A995DD06-FA5B-3C4A-9EC2-FFA80E37B40D}" type="datetimeFigureOut">
               <a:rPr lang="en-US" smtClean="0"/>
-              <a:t>4/14/19</a:t>
+              <a:t>4/15/19</a:t>
             </a:fld>
             <a:endParaRPr lang="en-US"/>
           </a:p>
@@ -1403,7 +1403,7 @@
           <a:p>
             <a:fld id="{A995DD06-FA5B-3C4A-9EC2-FFA80E37B40D}" type="datetimeFigureOut">
               <a:rPr lang="en-US" smtClean="0"/>
-              <a:t>4/14/19</a:t>
+              <a:t>4/15/19</a:t>
             </a:fld>
             <a:endParaRPr lang="en-US"/>
           </a:p>
@@ -1815,7 +1815,7 @@
           <a:p>
             <a:fld id="{A995DD06-FA5B-3C4A-9EC2-FFA80E37B40D}" type="datetimeFigureOut">
               <a:rPr lang="en-US" smtClean="0"/>
-              <a:t>4/14/19</a:t>
+              <a:t>4/15/19</a:t>
             </a:fld>
             <a:endParaRPr lang="en-US"/>
           </a:p>
@@ -1956,7 +1956,7 @@
           <a:p>
             <a:fld id="{A995DD06-FA5B-3C4A-9EC2-FFA80E37B40D}" type="datetimeFigureOut">
               <a:rPr lang="en-US" smtClean="0"/>
-              <a:t>4/14/19</a:t>
+              <a:t>4/15/19</a:t>
             </a:fld>
             <a:endParaRPr lang="en-US"/>
           </a:p>
@@ -2069,7 +2069,7 @@
           <a:p>
             <a:fld id="{A995DD06-FA5B-3C4A-9EC2-FFA80E37B40D}" type="datetimeFigureOut">
               <a:rPr lang="en-US" smtClean="0"/>
-              <a:t>4/14/19</a:t>
+              <a:t>4/15/19</a:t>
             </a:fld>
             <a:endParaRPr lang="en-US"/>
           </a:p>
@@ -2380,7 +2380,7 @@
           <a:p>
             <a:fld id="{A995DD06-FA5B-3C4A-9EC2-FFA80E37B40D}" type="datetimeFigureOut">
               <a:rPr lang="en-US" smtClean="0"/>
-              <a:t>4/14/19</a:t>
+              <a:t>4/15/19</a:t>
             </a:fld>
             <a:endParaRPr lang="en-US"/>
           </a:p>
@@ -2668,7 +2668,7 @@
           <a:p>
             <a:fld id="{A995DD06-FA5B-3C4A-9EC2-FFA80E37B40D}" type="datetimeFigureOut">
               <a:rPr lang="en-US" smtClean="0"/>
-              <a:t>4/14/19</a:t>
+              <a:t>4/15/19</a:t>
             </a:fld>
             <a:endParaRPr lang="en-US"/>
           </a:p>
@@ -2909,7 +2909,7 @@
           <a:p>
             <a:fld id="{A995DD06-FA5B-3C4A-9EC2-FFA80E37B40D}" type="datetimeFigureOut">
               <a:rPr lang="en-US" smtClean="0"/>
-              <a:t>4/14/19</a:t>
+              <a:t>4/15/19</a:t>
             </a:fld>
             <a:endParaRPr lang="en-US"/>
           </a:p>
@@ -4399,8 +4399,8 @@
         </p:nvSpPr>
         <p:spPr>
           <a:xfrm>
-            <a:off x="1159186" y="5267675"/>
-            <a:ext cx="1437667" cy="215444"/>
+            <a:off x="1156572" y="5288170"/>
+            <a:ext cx="1437667" cy="184666"/>
           </a:xfrm>
           <a:prstGeom prst="rect">
             <a:avLst/>
@@ -4426,10 +4426,10 @@
           <a:p>
             <a:pPr algn="ctr"/>
             <a:r>
-              <a:rPr lang="en-US" dirty="0" err="1"/>
+              <a:rPr lang="en-US" sz="1200" dirty="0" err="1"/>
               <a:t>CommandResult</a:t>
             </a:r>
-            <a:endParaRPr lang="en-US" dirty="0"/>
+            <a:endParaRPr lang="en-US" sz="1200" dirty="0"/>
           </a:p>
         </p:txBody>
       </p:sp>

</xml_diff>